<commit_message>
update cog sci analysis, update packages
</commit_message>
<xml_diff>
--- a/analysis/img/v3_adaptive_bot_dyad_wcd_correlation_edits.pptx
+++ b/analysis/img/v3_adaptive_bot_dyad_wcd_correlation_edits.pptx
@@ -264,7 +264,7 @@
           <a:p>
             <a:fld id="{F755E228-6451-3F4F-8DC6-07638FB4C03D}" type="datetimeFigureOut">
               <a:rPr lang="en-US" smtClean="0"/>
-              <a:t>5/10/21</a:t>
+              <a:t>5/11/21</a:t>
             </a:fld>
             <a:endParaRPr lang="en-US"/>
           </a:p>
@@ -434,7 +434,7 @@
           <a:p>
             <a:fld id="{F755E228-6451-3F4F-8DC6-07638FB4C03D}" type="datetimeFigureOut">
               <a:rPr lang="en-US" smtClean="0"/>
-              <a:t>5/10/21</a:t>
+              <a:t>5/11/21</a:t>
             </a:fld>
             <a:endParaRPr lang="en-US"/>
           </a:p>
@@ -614,7 +614,7 @@
           <a:p>
             <a:fld id="{F755E228-6451-3F4F-8DC6-07638FB4C03D}" type="datetimeFigureOut">
               <a:rPr lang="en-US" smtClean="0"/>
-              <a:t>5/10/21</a:t>
+              <a:t>5/11/21</a:t>
             </a:fld>
             <a:endParaRPr lang="en-US"/>
           </a:p>
@@ -784,7 +784,7 @@
           <a:p>
             <a:fld id="{F755E228-6451-3F4F-8DC6-07638FB4C03D}" type="datetimeFigureOut">
               <a:rPr lang="en-US" smtClean="0"/>
-              <a:t>5/10/21</a:t>
+              <a:t>5/11/21</a:t>
             </a:fld>
             <a:endParaRPr lang="en-US"/>
           </a:p>
@@ -1028,7 +1028,7 @@
           <a:p>
             <a:fld id="{F755E228-6451-3F4F-8DC6-07638FB4C03D}" type="datetimeFigureOut">
               <a:rPr lang="en-US" smtClean="0"/>
-              <a:t>5/10/21</a:t>
+              <a:t>5/11/21</a:t>
             </a:fld>
             <a:endParaRPr lang="en-US"/>
           </a:p>
@@ -1260,7 +1260,7 @@
           <a:p>
             <a:fld id="{F755E228-6451-3F4F-8DC6-07638FB4C03D}" type="datetimeFigureOut">
               <a:rPr lang="en-US" smtClean="0"/>
-              <a:t>5/10/21</a:t>
+              <a:t>5/11/21</a:t>
             </a:fld>
             <a:endParaRPr lang="en-US"/>
           </a:p>
@@ -1627,7 +1627,7 @@
           <a:p>
             <a:fld id="{F755E228-6451-3F4F-8DC6-07638FB4C03D}" type="datetimeFigureOut">
               <a:rPr lang="en-US" smtClean="0"/>
-              <a:t>5/10/21</a:t>
+              <a:t>5/11/21</a:t>
             </a:fld>
             <a:endParaRPr lang="en-US"/>
           </a:p>
@@ -1745,7 +1745,7 @@
           <a:p>
             <a:fld id="{F755E228-6451-3F4F-8DC6-07638FB4C03D}" type="datetimeFigureOut">
               <a:rPr lang="en-US" smtClean="0"/>
-              <a:t>5/10/21</a:t>
+              <a:t>5/11/21</a:t>
             </a:fld>
             <a:endParaRPr lang="en-US"/>
           </a:p>
@@ -1840,7 +1840,7 @@
           <a:p>
             <a:fld id="{F755E228-6451-3F4F-8DC6-07638FB4C03D}" type="datetimeFigureOut">
               <a:rPr lang="en-US" smtClean="0"/>
-              <a:t>5/10/21</a:t>
+              <a:t>5/11/21</a:t>
             </a:fld>
             <a:endParaRPr lang="en-US"/>
           </a:p>
@@ -2117,7 +2117,7 @@
           <a:p>
             <a:fld id="{F755E228-6451-3F4F-8DC6-07638FB4C03D}" type="datetimeFigureOut">
               <a:rPr lang="en-US" smtClean="0"/>
-              <a:t>5/10/21</a:t>
+              <a:t>5/11/21</a:t>
             </a:fld>
             <a:endParaRPr lang="en-US"/>
           </a:p>
@@ -2374,7 +2374,7 @@
           <a:p>
             <a:fld id="{F755E228-6451-3F4F-8DC6-07638FB4C03D}" type="datetimeFigureOut">
               <a:rPr lang="en-US" smtClean="0"/>
-              <a:t>5/10/21</a:t>
+              <a:t>5/11/21</a:t>
             </a:fld>
             <a:endParaRPr lang="en-US"/>
           </a:p>
@@ -2587,7 +2587,7 @@
           <a:p>
             <a:fld id="{F755E228-6451-3F4F-8DC6-07638FB4C03D}" type="datetimeFigureOut">
               <a:rPr lang="en-US" smtClean="0"/>
-              <a:t>5/10/21</a:t>
+              <a:t>5/11/21</a:t>
             </a:fld>
             <a:endParaRPr lang="en-US"/>
           </a:p>
@@ -2994,10 +2994,10 @@
       </p:grpSpPr>
       <p:pic>
         <p:nvPicPr>
-          <p:cNvPr id="3" name="Picture 2">
+          <p:cNvPr id="4" name="Picture 3">
             <a:extLst>
               <a:ext uri="{FF2B5EF4-FFF2-40B4-BE49-F238E27FC236}">
-                <a16:creationId xmlns:a16="http://schemas.microsoft.com/office/drawing/2014/main" id="{BCD9BC75-4886-3C43-BFD2-8E0B544B2AD6}"/>
+                <a16:creationId xmlns:a16="http://schemas.microsoft.com/office/drawing/2014/main" id="{D7F518BE-C6EF-9A44-B5D9-2C7F1A85B7EB}"/>
               </a:ext>
             </a:extLst>
           </p:cNvPr>
@@ -3022,8 +3022,8 @@
           </a:prstGeom>
         </p:spPr>
       </p:pic>
-      <mc:AlternateContent xmlns:mc="http://schemas.openxmlformats.org/markup-compatibility/2006">
-        <mc:Choice xmlns:a14="http://schemas.microsoft.com/office/drawing/2010/main" Requires="a14">
+      <mc:AlternateContent xmlns:mc="http://schemas.openxmlformats.org/markup-compatibility/2006" xmlns:a14="http://schemas.microsoft.com/office/drawing/2010/main">
+        <mc:Choice Requires="a14">
           <p:sp>
             <p:nvSpPr>
               <p:cNvPr id="8" name="TextBox 7">
@@ -3127,7 +3127,7 @@
             </p:txBody>
           </p:sp>
         </mc:Choice>
-        <mc:Fallback>
+        <mc:Fallback xmlns="">
           <p:sp>
             <p:nvSpPr>
               <p:cNvPr id="8" name="TextBox 7">

</xml_diff>